<commit_message>
Small change to lecture 1A
- added a single slide talking about why not to panic, using google and reaching out to ask for help if needed.
</commit_message>
<xml_diff>
--- a/Lecture 1/Lecture_1_Course details 2019.pptx
+++ b/Lecture 1/Lecture_1_Course details 2019.pptx
@@ -5,7 +5,7 @@
     <p:sldMasterId id="2147483787" r:id="rId1"/>
   </p:sldMasterIdLst>
   <p:notesMasterIdLst>
-    <p:notesMasterId r:id="rId11"/>
+    <p:notesMasterId r:id="rId12"/>
   </p:notesMasterIdLst>
   <p:sldIdLst>
     <p:sldId id="256" r:id="rId2"/>
@@ -15,8 +15,9 @@
     <p:sldId id="267" r:id="rId6"/>
     <p:sldId id="287" r:id="rId7"/>
     <p:sldId id="259" r:id="rId8"/>
-    <p:sldId id="261" r:id="rId9"/>
-    <p:sldId id="282" r:id="rId10"/>
+    <p:sldId id="288" r:id="rId9"/>
+    <p:sldId id="261" r:id="rId10"/>
+    <p:sldId id="282" r:id="rId11"/>
   </p:sldIdLst>
   <p:sldSz cx="9144000" cy="6858000" type="screen4x3"/>
   <p:notesSz cx="6858000" cy="9144000"/>
@@ -127,6 +128,7 @@
             <p14:sldId id="267"/>
             <p14:sldId id="287"/>
             <p14:sldId id="259"/>
+            <p14:sldId id="288"/>
             <p14:sldId id="261"/>
             <p14:sldId id="282"/>
           </p14:sldIdLst>
@@ -3568,6 +3570,154 @@
 </p:sld>
 </file>
 
+<file path=ppt/slides/slide10.xml><?xml version="1.0" encoding="utf-8"?>
+<p:sld xmlns:a="http://schemas.openxmlformats.org/drawingml/2006/main" xmlns:r="http://schemas.openxmlformats.org/officeDocument/2006/relationships" xmlns:p="http://schemas.openxmlformats.org/presentationml/2006/main">
+  <p:cSld>
+    <p:spTree>
+      <p:nvGrpSpPr>
+        <p:cNvPr id="1" name=""/>
+        <p:cNvGrpSpPr/>
+        <p:nvPr/>
+      </p:nvGrpSpPr>
+      <p:grpSpPr>
+        <a:xfrm>
+          <a:off x="0" y="0"/>
+          <a:ext cx="0" cy="0"/>
+          <a:chOff x="0" y="0"/>
+          <a:chExt cx="0" cy="0"/>
+        </a:xfrm>
+      </p:grpSpPr>
+      <p:sp>
+        <p:nvSpPr>
+          <p:cNvPr id="2" name="Title 1"/>
+          <p:cNvSpPr>
+            <a:spLocks noGrp="1"/>
+          </p:cNvSpPr>
+          <p:nvPr>
+            <p:ph type="title"/>
+          </p:nvPr>
+        </p:nvSpPr>
+        <p:spPr/>
+        <p:txBody>
+          <a:bodyPr/>
+          <a:lstStyle/>
+          <a:p>
+            <a:r>
+              <a:rPr lang="en-US" dirty="0"/>
+              <a:t>Good practice</a:t>
+            </a:r>
+          </a:p>
+        </p:txBody>
+      </p:sp>
+      <p:sp>
+        <p:nvSpPr>
+          <p:cNvPr id="3" name="Content Placeholder 2"/>
+          <p:cNvSpPr>
+            <a:spLocks noGrp="1"/>
+          </p:cNvSpPr>
+          <p:nvPr>
+            <p:ph idx="1"/>
+          </p:nvPr>
+        </p:nvSpPr>
+        <p:spPr/>
+        <p:txBody>
+          <a:bodyPr>
+            <a:normAutofit/>
+          </a:bodyPr>
+          <a:lstStyle/>
+          <a:p>
+            <a:r>
+              <a:rPr lang="en-US" dirty="0"/>
+              <a:t>Regardless of your software package, always</a:t>
+            </a:r>
+          </a:p>
+          <a:p>
+            <a:pPr lvl="1"/>
+            <a:r>
+              <a:rPr lang="en-US" dirty="0"/>
+              <a:t>Save and annotate your analytical code</a:t>
+            </a:r>
+          </a:p>
+          <a:p>
+            <a:pPr lvl="1"/>
+            <a:r>
+              <a:rPr lang="en-US" dirty="0"/>
+              <a:t>Use this course to develop good coding practices</a:t>
+            </a:r>
+          </a:p>
+          <a:p>
+            <a:pPr lvl="1"/>
+            <a:r>
+              <a:rPr lang="en-US" dirty="0"/>
+              <a:t>Ask yourself if a stranger could walk in and easily reproduce your findings</a:t>
+            </a:r>
+          </a:p>
+          <a:p>
+            <a:pPr lvl="1"/>
+            <a:r>
+              <a:rPr lang="en-US" dirty="0"/>
+              <a:t>More importantly, make sure </a:t>
+            </a:r>
+            <a:r>
+              <a:rPr lang="en-US" b="1" dirty="0">
+                <a:solidFill>
+                  <a:srgbClr val="FF0000"/>
+                </a:solidFill>
+              </a:rPr>
+              <a:t>you</a:t>
+            </a:r>
+            <a:r>
+              <a:rPr lang="en-US" dirty="0">
+                <a:solidFill>
+                  <a:srgbClr val="FF0000"/>
+                </a:solidFill>
+              </a:rPr>
+              <a:t> can reproduce your findings</a:t>
+            </a:r>
+            <a:r>
+              <a:rPr lang="is-IS" dirty="0"/>
+              <a:t>…even if you’re revisiting an analysis much later (this happens a lot)</a:t>
+            </a:r>
+            <a:endParaRPr lang="en-US" dirty="0"/>
+          </a:p>
+          <a:p>
+            <a:r>
+              <a:rPr lang="en-US" dirty="0"/>
+              <a:t>Key word </a:t>
+            </a:r>
+            <a:r>
+              <a:rPr lang="en-US"/>
+              <a:t>= </a:t>
+            </a:r>
+            <a:r>
+              <a:rPr lang="en-US">
+                <a:solidFill>
+                  <a:srgbClr val="FF0000"/>
+                </a:solidFill>
+              </a:rPr>
+              <a:t>reproducible</a:t>
+            </a:r>
+            <a:endParaRPr lang="en-US" dirty="0">
+              <a:solidFill>
+                <a:srgbClr val="FF0000"/>
+              </a:solidFill>
+            </a:endParaRPr>
+          </a:p>
+        </p:txBody>
+      </p:sp>
+    </p:spTree>
+    <p:extLst>
+      <p:ext uri="{BB962C8B-B14F-4D97-AF65-F5344CB8AC3E}">
+        <p14:creationId xmlns:p14="http://schemas.microsoft.com/office/powerpoint/2010/main" val="3413403235"/>
+      </p:ext>
+    </p:extLst>
+  </p:cSld>
+  <p:clrMapOvr>
+    <a:masterClrMapping/>
+  </p:clrMapOvr>
+</p:sld>
+</file>
+
 <file path=ppt/slides/slide2.xml><?xml version="1.0" encoding="utf-8"?>
 <p:sld xmlns:a="http://schemas.openxmlformats.org/drawingml/2006/main" xmlns:r="http://schemas.openxmlformats.org/officeDocument/2006/relationships" xmlns:p="http://schemas.openxmlformats.org/presentationml/2006/main">
   <p:cSld>
@@ -7598,7 +7748,11 @@
           <a:p>
             <a:pPr lvl="1"/>
             <a:r>
-              <a:rPr lang="en-US" dirty="0"/>
+              <a:rPr lang="en-US" dirty="0">
+                <a:solidFill>
+                  <a:srgbClr val="0070C0"/>
+                </a:solidFill>
+              </a:rPr>
               <a:t>Don’t panic</a:t>
             </a:r>
           </a:p>
@@ -7651,7 +7805,13 @@
       </p:grpSpPr>
       <p:sp>
         <p:nvSpPr>
-          <p:cNvPr id="2" name="Title 1"/>
+          <p:cNvPr id="2" name="Title 1">
+            <a:extLst>
+              <a:ext uri="{FF2B5EF4-FFF2-40B4-BE49-F238E27FC236}">
+                <a16:creationId xmlns:a16="http://schemas.microsoft.com/office/drawing/2014/main" id="{B3701600-A7BF-4E01-983E-E894E97A454C}"/>
+              </a:ext>
+            </a:extLst>
+          </p:cNvPr>
           <p:cNvSpPr>
             <a:spLocks noGrp="1"/>
           </p:cNvSpPr>
@@ -7665,15 +7825,22 @@
           <a:lstStyle/>
           <a:p>
             <a:r>
-              <a:rPr lang="en-US" dirty="0"/>
-              <a:t>Software options</a:t>
-            </a:r>
+              <a:rPr lang="en-CA" dirty="0"/>
+              <a:t>Why not to panic </a:t>
+            </a:r>
+            <a:endParaRPr lang="en-US" dirty="0"/>
           </a:p>
         </p:txBody>
       </p:sp>
       <p:sp>
         <p:nvSpPr>
-          <p:cNvPr id="3" name="Content Placeholder 2"/>
+          <p:cNvPr id="3" name="Content Placeholder 2">
+            <a:extLst>
+              <a:ext uri="{FF2B5EF4-FFF2-40B4-BE49-F238E27FC236}">
+                <a16:creationId xmlns:a16="http://schemas.microsoft.com/office/drawing/2014/main" id="{5D8108F4-EF66-4674-8761-E20B121FCF07}"/>
+              </a:ext>
+            </a:extLst>
+          </p:cNvPr>
           <p:cNvSpPr>
             <a:spLocks noGrp="1"/>
           </p:cNvSpPr>
@@ -7683,66 +7850,83 @@
         </p:nvSpPr>
         <p:spPr/>
         <p:txBody>
-          <a:bodyPr>
-            <a:normAutofit lnSpcReduction="10000"/>
-          </a:bodyPr>
+          <a:bodyPr/>
           <a:lstStyle/>
           <a:p>
             <a:r>
+              <a:rPr lang="en-CA" dirty="0"/>
+              <a:t>Learning new software/ programming language is frustrating at first for </a:t>
+            </a:r>
+            <a:r>
+              <a:rPr lang="en-CA" i="1" dirty="0">
+                <a:solidFill>
+                  <a:srgbClr val="FF0000"/>
+                </a:solidFill>
+              </a:rPr>
+              <a:t>everyone</a:t>
+            </a:r>
+          </a:p>
+          <a:p>
+            <a:r>
+              <a:rPr lang="en-CA" dirty="0"/>
+              <a:t>Any issue you might have, chances are someone else already faced and resolved the issue</a:t>
+            </a:r>
+          </a:p>
+          <a:p>
+            <a:r>
+              <a:rPr lang="en-CA" dirty="0"/>
+              <a:t>&gt;70% chances </a:t>
+            </a:r>
+            <a:r>
+              <a:rPr lang="en-CA" i="1" dirty="0">
+                <a:solidFill>
+                  <a:srgbClr val="FF0000"/>
+                </a:solidFill>
+              </a:rPr>
+              <a:t>I have</a:t>
+            </a:r>
+            <a:r>
+              <a:rPr lang="en-CA" dirty="0"/>
+              <a:t> faced a similar issue</a:t>
+            </a:r>
+          </a:p>
+          <a:p>
+            <a:r>
               <a:rPr lang="en-US" dirty="0"/>
-              <a:t>Popular software packages for quantitative analysis:</a:t>
-            </a:r>
-          </a:p>
-          <a:p>
-            <a:pPr lvl="1"/>
+              <a:t>Google &amp; </a:t>
+            </a:r>
+            <a:r>
+              <a:rPr lang="en-US" dirty="0" err="1"/>
+              <a:t>stackoverflow</a:t>
+            </a:r>
             <a:r>
               <a:rPr lang="en-US" dirty="0"/>
-              <a:t>R </a:t>
-            </a:r>
-          </a:p>
-          <a:p>
-            <a:pPr lvl="1"/>
+              <a:t> are your friends</a:t>
+            </a:r>
+          </a:p>
+          <a:p>
             <a:r>
               <a:rPr lang="en-US" dirty="0"/>
-              <a:t>Stata</a:t>
-            </a:r>
-          </a:p>
-          <a:p>
-            <a:pPr lvl="1"/>
-            <a:r>
-              <a:rPr lang="en-US" dirty="0"/>
-              <a:t>SAS </a:t>
-            </a:r>
-          </a:p>
-          <a:p>
-            <a:pPr lvl="1"/>
-            <a:r>
-              <a:rPr lang="en-US" dirty="0"/>
-              <a:t>SPSS</a:t>
-            </a:r>
-          </a:p>
-          <a:p>
-            <a:pPr lvl="1"/>
-            <a:r>
-              <a:rPr lang="en-US" dirty="0"/>
-              <a:t>Many more…</a:t>
-            </a:r>
-          </a:p>
-          <a:p>
-            <a:r>
-              <a:rPr lang="en-US" dirty="0"/>
-              <a:t>Your supervisor might ask you to learn a second program (this is a good thing)</a:t>
-            </a:r>
-          </a:p>
-          <a:p>
-            <a:endParaRPr lang="en-US" dirty="0"/>
+              <a:t>If stuck, </a:t>
+            </a:r>
+            <a:r>
+              <a:rPr lang="en-US" b="1" dirty="0">
+                <a:solidFill>
+                  <a:schemeClr val="tx2">
+                    <a:lumMod val="60000"/>
+                    <a:lumOff val="40000"/>
+                  </a:schemeClr>
+                </a:solidFill>
+              </a:rPr>
+              <a:t>ask for help!</a:t>
+            </a:r>
           </a:p>
         </p:txBody>
       </p:sp>
     </p:spTree>
     <p:extLst>
       <p:ext uri="{BB962C8B-B14F-4D97-AF65-F5344CB8AC3E}">
-        <p14:creationId xmlns:p14="http://schemas.microsoft.com/office/powerpoint/2010/main" val="4049335647"/>
+        <p14:creationId xmlns:p14="http://schemas.microsoft.com/office/powerpoint/2010/main" val="2378694837"/>
       </p:ext>
     </p:extLst>
   </p:cSld>
@@ -7786,7 +7970,7 @@
           <a:p>
             <a:r>
               <a:rPr lang="en-US" dirty="0"/>
-              <a:t>Good practice</a:t>
+              <a:t>Software options</a:t>
             </a:r>
           </a:p>
         </p:txBody>
@@ -7804,93 +7988,65 @@
         <p:spPr/>
         <p:txBody>
           <a:bodyPr>
-            <a:normAutofit/>
+            <a:normAutofit lnSpcReduction="10000"/>
           </a:bodyPr>
           <a:lstStyle/>
           <a:p>
             <a:r>
               <a:rPr lang="en-US" dirty="0"/>
-              <a:t>Regardless of your software package, always</a:t>
+              <a:t>Popular software packages for quantitative analysis:</a:t>
             </a:r>
           </a:p>
           <a:p>
             <a:pPr lvl="1"/>
             <a:r>
               <a:rPr lang="en-US" dirty="0"/>
-              <a:t>Save and annotate your analytical code</a:t>
+              <a:t>R </a:t>
             </a:r>
           </a:p>
           <a:p>
             <a:pPr lvl="1"/>
             <a:r>
               <a:rPr lang="en-US" dirty="0"/>
-              <a:t>Use this course to develop good coding practices</a:t>
+              <a:t>Stata</a:t>
             </a:r>
           </a:p>
           <a:p>
             <a:pPr lvl="1"/>
             <a:r>
               <a:rPr lang="en-US" dirty="0"/>
-              <a:t>Ask yourself if a stranger could walk in and easily reproduce your findings</a:t>
+              <a:t>SAS </a:t>
             </a:r>
           </a:p>
           <a:p>
             <a:pPr lvl="1"/>
             <a:r>
               <a:rPr lang="en-US" dirty="0"/>
-              <a:t>More importantly, make sure </a:t>
-            </a:r>
-            <a:r>
-              <a:rPr lang="en-US" b="1" dirty="0">
-                <a:solidFill>
-                  <a:srgbClr val="FF0000"/>
-                </a:solidFill>
-              </a:rPr>
-              <a:t>you</a:t>
-            </a:r>
-            <a:r>
-              <a:rPr lang="en-US" dirty="0">
-                <a:solidFill>
-                  <a:srgbClr val="FF0000"/>
-                </a:solidFill>
-              </a:rPr>
-              <a:t> can reproduce your findings</a:t>
-            </a:r>
-            <a:r>
-              <a:rPr lang="is-IS" dirty="0"/>
-              <a:t>…even if you’re revisiting an analysis much later (this happens a lot)</a:t>
-            </a:r>
+              <a:t>SPSS</a:t>
+            </a:r>
+          </a:p>
+          <a:p>
+            <a:pPr lvl="1"/>
+            <a:r>
+              <a:rPr lang="en-US" dirty="0"/>
+              <a:t>Many more…</a:t>
+            </a:r>
+          </a:p>
+          <a:p>
+            <a:r>
+              <a:rPr lang="en-US" dirty="0"/>
+              <a:t>Your supervisor might ask you to learn a second program (this is a good thing)</a:t>
+            </a:r>
+          </a:p>
+          <a:p>
             <a:endParaRPr lang="en-US" dirty="0"/>
-          </a:p>
-          <a:p>
-            <a:r>
-              <a:rPr lang="en-US" dirty="0"/>
-              <a:t>Key word </a:t>
-            </a:r>
-            <a:r>
-              <a:rPr lang="en-US"/>
-              <a:t>= </a:t>
-            </a:r>
-            <a:r>
-              <a:rPr lang="en-US">
-                <a:solidFill>
-                  <a:srgbClr val="FF0000"/>
-                </a:solidFill>
-              </a:rPr>
-              <a:t>reproducible</a:t>
-            </a:r>
-            <a:endParaRPr lang="en-US" dirty="0">
-              <a:solidFill>
-                <a:srgbClr val="FF0000"/>
-              </a:solidFill>
-            </a:endParaRPr>
           </a:p>
         </p:txBody>
       </p:sp>
     </p:spTree>
     <p:extLst>
       <p:ext uri="{BB962C8B-B14F-4D97-AF65-F5344CB8AC3E}">
-        <p14:creationId xmlns:p14="http://schemas.microsoft.com/office/powerpoint/2010/main" val="3413403235"/>
+        <p14:creationId xmlns:p14="http://schemas.microsoft.com/office/powerpoint/2010/main" val="4049335647"/>
       </p:ext>
     </p:extLst>
   </p:cSld>

</xml_diff>